<commit_message>
updating Lecture 3 and 4 slides and lecture 4 handout.
</commit_message>
<xml_diff>
--- a/lecture/slides/ECE_383_Lec3.pptx
+++ b/lecture/slides/ECE_383_Lec3.pptx
@@ -1285,7 +1285,7 @@
                 </a:spcAft>
                 <a:defRPr/>
               </a:pPr>
-              <a:t>9 January 2017</a:t>
+              <a:t>11 January 2017</a:t>
             </a:fld>
             <a:endParaRPr lang="en-US" sz="1800">
               <a:solidFill>
@@ -1531,7 +1531,7 @@
                 </a:spcAft>
                 <a:defRPr/>
               </a:pPr>
-              <a:t>9 January 2017</a:t>
+              <a:t>11 January 2017</a:t>
             </a:fld>
             <a:endParaRPr lang="en-US" sz="1800">
               <a:solidFill>
@@ -1745,7 +1745,7 @@
                 </a:spcAft>
                 <a:defRPr/>
               </a:pPr>
-              <a:t>9 January 2017</a:t>
+              <a:t>11 January 2017</a:t>
             </a:fld>
             <a:endParaRPr lang="en-US" sz="1800">
               <a:solidFill>
@@ -1975,7 +1975,7 @@
                 </a:spcAft>
                 <a:defRPr/>
               </a:pPr>
-              <a:t>9 January 2017</a:t>
+              <a:t>11 January 2017</a:t>
             </a:fld>
             <a:endParaRPr lang="en-US" sz="1800">
               <a:solidFill>
@@ -2240,7 +2240,7 @@
                 </a:spcAft>
                 <a:defRPr/>
               </a:pPr>
-              <a:t>9 January 2017</a:t>
+              <a:t>11 January 2017</a:t>
             </a:fld>
             <a:endParaRPr lang="en-US" sz="1800">
               <a:solidFill>
@@ -2594,7 +2594,7 @@
                 </a:spcAft>
                 <a:defRPr/>
               </a:pPr>
-              <a:t>9 January 2017</a:t>
+              <a:t>11 January 2017</a:t>
             </a:fld>
             <a:endParaRPr lang="en-US" sz="1800">
               <a:solidFill>
@@ -3087,7 +3087,7 @@
                 </a:spcAft>
                 <a:defRPr/>
               </a:pPr>
-              <a:t>9 January 2017</a:t>
+              <a:t>11 January 2017</a:t>
             </a:fld>
             <a:endParaRPr lang="en-US" sz="1800">
               <a:solidFill>
@@ -3271,7 +3271,7 @@
                 </a:spcAft>
                 <a:defRPr/>
               </a:pPr>
-              <a:t>9 January 2017</a:t>
+              <a:t>11 January 2017</a:t>
             </a:fld>
             <a:endParaRPr lang="en-US" sz="1800">
               <a:solidFill>
@@ -3432,7 +3432,7 @@
                 </a:spcAft>
                 <a:defRPr/>
               </a:pPr>
-              <a:t>9 January 2017</a:t>
+              <a:t>11 January 2017</a:t>
             </a:fld>
             <a:endParaRPr lang="en-US" sz="1800">
               <a:solidFill>
@@ -3775,7 +3775,7 @@
                 </a:spcAft>
                 <a:defRPr/>
               </a:pPr>
-              <a:t>9 January 2017</a:t>
+              <a:t>11 January 2017</a:t>
             </a:fld>
             <a:endParaRPr lang="en-US" sz="1800">
               <a:solidFill>
@@ -4095,7 +4095,7 @@
                 </a:spcAft>
                 <a:defRPr/>
               </a:pPr>
-              <a:t>9 January 2017</a:t>
+              <a:t>11 January 2017</a:t>
             </a:fld>
             <a:endParaRPr lang="en-US" sz="1800">
               <a:solidFill>
@@ -5253,19 +5253,8 @@
                 <a:effectLst/>
                 <a:latin typeface="Trebuchet MS" panose="020B0603020202020204" pitchFamily="34" charset="0"/>
               </a:rPr>
-              <a:t>– </a:t>
-            </a:r>
-            <a:r>
-              <a:rPr lang="en-US" sz="3200" kern="0" dirty="0">
-                <a:effectLst/>
-                <a:latin typeface="Trebuchet MS" panose="020B0603020202020204" pitchFamily="34" charset="0"/>
-              </a:rPr>
-              <a:t>Combinational Element, unsigned, constraints file, synthesis</a:t>
-            </a:r>
-            <a:endParaRPr lang="en-US" sz="3200" kern="0" dirty="0">
-              <a:effectLst/>
-              <a:latin typeface="Trebuchet MS" panose="020B0603020202020204" pitchFamily="34" charset="0"/>
-            </a:endParaRPr>
+              <a:t>– Combinational Element, unsigned, constraints file, synthesis</a:t>
+            </a:r>
           </a:p>
         </p:txBody>
       </p:sp>
@@ -5638,11 +5627,11 @@
   <p:clrMapOvr>
     <a:masterClrMapping/>
   </p:clrMapOvr>
-  <mc:AlternateContent xmlns:mc="http://schemas.openxmlformats.org/markup-compatibility/2006">
-    <mc:Choice xmlns:p14="http://schemas.microsoft.com/office/powerpoint/2010/main" Requires="p14">
+  <mc:AlternateContent xmlns:mc="http://schemas.openxmlformats.org/markup-compatibility/2006" xmlns:p14="http://schemas.microsoft.com/office/powerpoint/2010/main">
+    <mc:Choice Requires="p14">
       <p:transition spd="slow" p14:dur="2000"/>
     </mc:Choice>
-    <mc:Fallback>
+    <mc:Fallback xmlns="">
       <p:transition spd="slow"/>
     </mc:Fallback>
   </mc:AlternateContent>
@@ -11016,6 +11005,34 @@
           </a:p>
         </p:txBody>
       </p:sp>
+      <p:sp>
+        <p:nvSpPr>
+          <p:cNvPr id="3" name="Rectangle 2"/>
+          <p:cNvSpPr/>
+          <p:nvPr/>
+        </p:nvSpPr>
+        <p:spPr>
+          <a:xfrm>
+            <a:off x="2543239" y="3198168"/>
+            <a:ext cx="4057521" cy="461665"/>
+          </a:xfrm>
+          <a:prstGeom prst="rect">
+            <a:avLst/>
+          </a:prstGeom>
+        </p:spPr>
+        <p:txBody>
+          <a:bodyPr wrap="none">
+            <a:spAutoFit/>
+          </a:bodyPr>
+          <a:lstStyle/>
+          <a:p>
+            <a:r>
+              <a:rPr lang="en-US" dirty="0"/>
+              <a:t>Lecture 4 – Sequential Element</a:t>
+            </a:r>
+          </a:p>
+        </p:txBody>
+      </p:sp>
     </p:spTree>
     <p:extLst>
       <p:ext uri="{BB962C8B-B14F-4D97-AF65-F5344CB8AC3E}">
@@ -11458,7 +11475,6 @@
               <a:rPr lang="en-US" sz="2800" dirty="0"/>
               <a:t>Constraints file </a:t>
             </a:r>
-            <a:endParaRPr lang="en-US" sz="2800" dirty="0"/>
           </a:p>
           <a:p>
             <a:pPr marL="514350" indent="-514350" eaLnBrk="1" hangingPunct="1">
@@ -12556,7 +12572,7 @@
                 </a:spcAft>
                 <a:defRPr/>
               </a:pPr>
-              <a:t>9 January 2017</a:t>
+              <a:t>11 January 2017</a:t>
             </a:fld>
             <a:endParaRPr lang="en-US" sz="1800">
               <a:solidFill>
@@ -12694,11 +12710,7 @@
           <a:p>
             <a:r>
               <a:rPr lang="en-US" dirty="0" smtClean="0"/>
-              <a:t>pp </a:t>
-            </a:r>
-            <a:r>
-              <a:rPr lang="en-US" dirty="0" smtClean="0"/>
-              <a:t>80</a:t>
+              <a:t>pp 80</a:t>
             </a:r>
             <a:endParaRPr lang="en-US" dirty="0"/>
           </a:p>
@@ -12917,22 +12929,14 @@
             </a:r>
             <a:r>
               <a:rPr lang="en-US" b="0" dirty="0" smtClean="0"/>
-              <a:t> </a:t>
-            </a:r>
+              <a:t> file</a:t>
+            </a:r>
+          </a:p>
+          <a:p>
+            <a:pPr lvl="1"/>
             <a:r>
               <a:rPr lang="en-US" b="0" dirty="0" smtClean="0"/>
-              <a:t>file</a:t>
-            </a:r>
-          </a:p>
-          <a:p>
-            <a:pPr lvl="1"/>
-            <a:r>
-              <a:rPr lang="en-US" b="0" dirty="0" smtClean="0"/>
-              <a:t>Inputs from switches and outputs to </a:t>
-            </a:r>
-            <a:r>
-              <a:rPr lang="en-US" b="0" dirty="0" smtClean="0"/>
-              <a:t>LEDs</a:t>
+              <a:t>Inputs from switches and outputs to LEDs</a:t>
             </a:r>
           </a:p>
           <a:p>
@@ -12943,7 +12947,6 @@
               <a:rPr lang="en-US" sz="400" b="0" dirty="0" smtClean="0"/>
               <a:t>		</a:t>
             </a:r>
-            <a:endParaRPr lang="en-US" sz="400" b="0" dirty="0" smtClean="0"/>
           </a:p>
           <a:p>
             <a:pPr marL="0" indent="0" eaLnBrk="1" hangingPunct="1">
@@ -13149,11 +13152,6 @@
               </a:rPr>
               <a:t>[1]</a:t>
             </a:r>
-            <a:endParaRPr lang="en-US" sz="1200" dirty="0">
-              <a:solidFill>
-                <a:srgbClr val="00B050"/>
-              </a:solidFill>
-            </a:endParaRPr>
           </a:p>
           <a:p>
             <a:pPr marL="0" indent="0" eaLnBrk="1" hangingPunct="1">
@@ -13755,7 +13753,6 @@
                 <a:rPr lang="en-US" sz="1800" dirty="0"/>
                 <a:t>f</a:t>
               </a:r>
-              <a:endParaRPr lang="en-US" sz="1800" dirty="0"/>
             </a:p>
           </p:txBody>
         </p:sp>
@@ -14019,10 +14016,6 @@
             <a:r>
               <a:rPr lang="en-US" cap="none" dirty="0"/>
               <a:t>Constraints file </a:t>
-            </a:r>
-            <a:r>
-              <a:rPr lang="en-US" cap="none" dirty="0"/>
-              <a:t/>
             </a:r>
             <a:br>
               <a:rPr lang="en-US" cap="none" dirty="0"/>

</xml_diff>